<commit_message>
preparing for online class system
</commit_message>
<xml_diff>
--- a/lect0-intro.pptx
+++ b/lect0-intro.pptx
@@ -5,20 +5,21 @@
     <p:sldMasterId id="2147483660" r:id="rId1"/>
   </p:sldMasterIdLst>
   <p:notesMasterIdLst>
-    <p:notesMasterId r:id="rId13"/>
+    <p:notesMasterId r:id="rId14"/>
   </p:notesMasterIdLst>
   <p:sldIdLst>
     <p:sldId id="256" r:id="rId2"/>
     <p:sldId id="274" r:id="rId3"/>
-    <p:sldId id="272" r:id="rId4"/>
-    <p:sldId id="277" r:id="rId5"/>
-    <p:sldId id="275" r:id="rId6"/>
-    <p:sldId id="273" r:id="rId7"/>
-    <p:sldId id="269" r:id="rId8"/>
-    <p:sldId id="276" r:id="rId9"/>
-    <p:sldId id="267" r:id="rId10"/>
-    <p:sldId id="268" r:id="rId11"/>
-    <p:sldId id="278" r:id="rId12"/>
+    <p:sldId id="279" r:id="rId4"/>
+    <p:sldId id="272" r:id="rId5"/>
+    <p:sldId id="277" r:id="rId6"/>
+    <p:sldId id="275" r:id="rId7"/>
+    <p:sldId id="273" r:id="rId8"/>
+    <p:sldId id="269" r:id="rId9"/>
+    <p:sldId id="276" r:id="rId10"/>
+    <p:sldId id="267" r:id="rId11"/>
+    <p:sldId id="268" r:id="rId12"/>
+    <p:sldId id="278" r:id="rId13"/>
   </p:sldIdLst>
   <p:sldSz cx="9144000" cy="6858000" type="screen4x3"/>
   <p:notesSz cx="6858000" cy="9144000"/>
@@ -22021,7 +22022,7 @@
           <a:p>
             <a:fld id="{575FEEB5-47E3-43D4-8A03-519B962D3D79}" type="datetimeFigureOut">
               <a:rPr lang="en-US" smtClean="0"/>
-              <a:t>2020-03-18</a:t>
+              <a:t>2020-09-04</a:t>
             </a:fld>
             <a:endParaRPr lang="en-US"/>
           </a:p>
@@ -22365,7 +22366,7 @@
           <a:p>
             <a:fld id="{D6C655A2-4ADD-4950-89D2-CB93C4B8A225}" type="slidenum">
               <a:rPr lang="en-US" smtClean="0"/>
-              <a:t>6</a:t>
+              <a:t>7</a:t>
             </a:fld>
             <a:endParaRPr lang="en-US"/>
           </a:p>
@@ -22515,7 +22516,7 @@
           <a:p>
             <a:fld id="{8489C22B-A7DD-4C74-AEBE-9C9578B07CB6}" type="datetime1">
               <a:rPr lang="en-US" smtClean="0"/>
-              <a:t>2020-03-18</a:t>
+              <a:t>2020-09-04</a:t>
             </a:fld>
             <a:endParaRPr lang="en-US"/>
           </a:p>
@@ -22685,7 +22686,7 @@
           <a:p>
             <a:fld id="{7E55CA85-A858-40A3-8DC3-D79F877F6ED5}" type="datetime1">
               <a:rPr lang="en-US" smtClean="0"/>
-              <a:t>2020-03-18</a:t>
+              <a:t>2020-09-04</a:t>
             </a:fld>
             <a:endParaRPr lang="en-US"/>
           </a:p>
@@ -22865,7 +22866,7 @@
           <a:p>
             <a:fld id="{C068399F-9011-402F-9375-B4C6E22766E5}" type="datetime1">
               <a:rPr lang="en-US" smtClean="0"/>
-              <a:t>2020-03-18</a:t>
+              <a:t>2020-09-04</a:t>
             </a:fld>
             <a:endParaRPr lang="en-US"/>
           </a:p>
@@ -23035,7 +23036,7 @@
           <a:p>
             <a:fld id="{B3AADD42-6F1D-444B-A82A-A4F674F90DC2}" type="datetime1">
               <a:rPr lang="en-US" smtClean="0"/>
-              <a:t>2020-03-18</a:t>
+              <a:t>2020-09-04</a:t>
             </a:fld>
             <a:endParaRPr lang="en-US"/>
           </a:p>
@@ -23279,7 +23280,7 @@
           <a:p>
             <a:fld id="{F7309AE8-EC40-4F7F-9097-60A625233DD8}" type="datetime1">
               <a:rPr lang="en-US" smtClean="0"/>
-              <a:t>2020-03-18</a:t>
+              <a:t>2020-09-04</a:t>
             </a:fld>
             <a:endParaRPr lang="en-US"/>
           </a:p>
@@ -23511,7 +23512,7 @@
           <a:p>
             <a:fld id="{54E0EDFB-87D9-434B-856E-0F0D5C55B119}" type="datetime1">
               <a:rPr lang="en-US" smtClean="0"/>
-              <a:t>2020-03-18</a:t>
+              <a:t>2020-09-04</a:t>
             </a:fld>
             <a:endParaRPr lang="en-US"/>
           </a:p>
@@ -23878,7 +23879,7 @@
           <a:p>
             <a:fld id="{0CDC2E97-4632-438D-A2C0-94167D4B8E93}" type="datetime1">
               <a:rPr lang="en-US" smtClean="0"/>
-              <a:t>2020-03-18</a:t>
+              <a:t>2020-09-04</a:t>
             </a:fld>
             <a:endParaRPr lang="en-US"/>
           </a:p>
@@ -23996,7 +23997,7 @@
           <a:p>
             <a:fld id="{74443CE8-72A7-4130-81E6-8F5AC5184124}" type="datetime1">
               <a:rPr lang="en-US" smtClean="0"/>
-              <a:t>2020-03-18</a:t>
+              <a:t>2020-09-04</a:t>
             </a:fld>
             <a:endParaRPr lang="en-US"/>
           </a:p>
@@ -24091,7 +24092,7 @@
           <a:p>
             <a:fld id="{BD43A32D-659D-4287-BF03-C6DA8B901E7A}" type="datetime1">
               <a:rPr lang="en-US" smtClean="0"/>
-              <a:t>2020-03-18</a:t>
+              <a:t>2020-09-04</a:t>
             </a:fld>
             <a:endParaRPr lang="en-US"/>
           </a:p>
@@ -24368,7 +24369,7 @@
           <a:p>
             <a:fld id="{F797F727-5EC0-4467-99DC-5A90AD93A3FB}" type="datetime1">
               <a:rPr lang="en-US" smtClean="0"/>
-              <a:t>2020-03-18</a:t>
+              <a:t>2020-09-04</a:t>
             </a:fld>
             <a:endParaRPr lang="en-US"/>
           </a:p>
@@ -24625,7 +24626,7 @@
           <a:p>
             <a:fld id="{1A286004-BD42-4F22-BA0E-71EC0B951F4B}" type="datetime1">
               <a:rPr lang="en-US" smtClean="0"/>
-              <a:t>2020-03-18</a:t>
+              <a:t>2020-09-04</a:t>
             </a:fld>
             <a:endParaRPr lang="en-US"/>
           </a:p>
@@ -24838,7 +24839,7 @@
           <a:p>
             <a:fld id="{6BF07DA8-936E-4D8D-B955-8300309C6924}" type="datetime1">
               <a:rPr lang="en-US" smtClean="0"/>
-              <a:t>2020-03-18</a:t>
+              <a:t>2020-09-04</a:t>
             </a:fld>
             <a:endParaRPr lang="en-US"/>
           </a:p>
@@ -25491,6 +25492,502 @@
           <p:cNvPr id="2" name="Title 1">
             <a:extLst>
               <a:ext uri="{FF2B5EF4-FFF2-40B4-BE49-F238E27FC236}">
+                <a16:creationId xmlns:a16="http://schemas.microsoft.com/office/drawing/2014/main" id="{D44D1E58-3772-4F2A-BA68-96DC4C4E44A8}"/>
+              </a:ext>
+            </a:extLst>
+          </p:cNvPr>
+          <p:cNvSpPr>
+            <a:spLocks noGrp="1"/>
+          </p:cNvSpPr>
+          <p:nvPr>
+            <p:ph type="title"/>
+          </p:nvPr>
+        </p:nvSpPr>
+        <p:spPr/>
+        <p:txBody>
+          <a:bodyPr/>
+          <a:lstStyle/>
+          <a:p>
+            <a:r>
+              <a:rPr lang="en-US" dirty="0"/>
+              <a:t>Pre-Lesson Quiz: How To</a:t>
+            </a:r>
+          </a:p>
+        </p:txBody>
+      </p:sp>
+      <p:sp>
+        <p:nvSpPr>
+          <p:cNvPr id="4" name="Rectangle 3">
+            <a:extLst>
+              <a:ext uri="{FF2B5EF4-FFF2-40B4-BE49-F238E27FC236}">
+                <a16:creationId xmlns:a16="http://schemas.microsoft.com/office/drawing/2014/main" id="{90CCD120-BE71-4378-9E78-78595DCA57D8}"/>
+              </a:ext>
+            </a:extLst>
+          </p:cNvPr>
+          <p:cNvSpPr/>
+          <p:nvPr/>
+        </p:nvSpPr>
+        <p:spPr>
+          <a:xfrm>
+            <a:off x="721453" y="1593909"/>
+            <a:ext cx="7617204" cy="4016062"/>
+          </a:xfrm>
+          <a:prstGeom prst="rect">
+            <a:avLst/>
+          </a:prstGeom>
+          <a:solidFill>
+            <a:schemeClr val="accent4">
+              <a:lumMod val="20000"/>
+              <a:lumOff val="80000"/>
+            </a:schemeClr>
+          </a:solidFill>
+        </p:spPr>
+        <p:style>
+          <a:lnRef idx="2">
+            <a:schemeClr val="accent4">
+              <a:shade val="50000"/>
+            </a:schemeClr>
+          </a:lnRef>
+          <a:fillRef idx="1">
+            <a:schemeClr val="accent4"/>
+          </a:fillRef>
+          <a:effectRef idx="0">
+            <a:schemeClr val="accent4"/>
+          </a:effectRef>
+          <a:fontRef idx="minor">
+            <a:schemeClr val="lt1"/>
+          </a:fontRef>
+        </p:style>
+        <p:txBody>
+          <a:bodyPr rtlCol="0" anchor="ctr"/>
+          <a:lstStyle/>
+          <a:p>
+            <a:pPr algn="ctr"/>
+            <a:endParaRPr lang="en-US" dirty="0"/>
+          </a:p>
+        </p:txBody>
+      </p:sp>
+      <p:sp>
+        <p:nvSpPr>
+          <p:cNvPr id="5" name="TextBox 4">
+            <a:extLst>
+              <a:ext uri="{FF2B5EF4-FFF2-40B4-BE49-F238E27FC236}">
+                <a16:creationId xmlns:a16="http://schemas.microsoft.com/office/drawing/2014/main" id="{76DB851C-3EB7-422A-8D3A-878544FE78E8}"/>
+              </a:ext>
+            </a:extLst>
+          </p:cNvPr>
+          <p:cNvSpPr txBox="1"/>
+          <p:nvPr/>
+        </p:nvSpPr>
+        <p:spPr>
+          <a:xfrm>
+            <a:off x="6071115" y="1729518"/>
+            <a:ext cx="2031325" cy="461665"/>
+          </a:xfrm>
+          <a:prstGeom prst="rect">
+            <a:avLst/>
+          </a:prstGeom>
+          <a:noFill/>
+        </p:spPr>
+        <p:txBody>
+          <a:bodyPr wrap="none" rtlCol="0">
+            <a:spAutoFit/>
+          </a:bodyPr>
+          <a:lstStyle/>
+          <a:p>
+            <a:pPr algn="ctr"/>
+            <a:r>
+              <a:rPr lang="ja-JP" altLang="en-US" sz="2400" dirty="0"/>
+              <a:t>角間　あざみ</a:t>
+            </a:r>
+            <a:endParaRPr lang="en-US" sz="2400" dirty="0"/>
+          </a:p>
+        </p:txBody>
+      </p:sp>
+      <p:sp>
+        <p:nvSpPr>
+          <p:cNvPr id="6" name="TextBox 5">
+            <a:extLst>
+              <a:ext uri="{FF2B5EF4-FFF2-40B4-BE49-F238E27FC236}">
+                <a16:creationId xmlns:a16="http://schemas.microsoft.com/office/drawing/2014/main" id="{E6F71F18-6E47-44FE-A8C1-DEE8CEFC6FF9}"/>
+              </a:ext>
+            </a:extLst>
+          </p:cNvPr>
+          <p:cNvSpPr txBox="1"/>
+          <p:nvPr/>
+        </p:nvSpPr>
+        <p:spPr>
+          <a:xfrm>
+            <a:off x="6014946" y="2102267"/>
+            <a:ext cx="2143664" cy="830997"/>
+          </a:xfrm>
+          <a:prstGeom prst="rect">
+            <a:avLst/>
+          </a:prstGeom>
+          <a:noFill/>
+        </p:spPr>
+        <p:txBody>
+          <a:bodyPr wrap="none" rtlCol="0">
+            <a:spAutoFit/>
+          </a:bodyPr>
+          <a:lstStyle/>
+          <a:p>
+            <a:pPr algn="ctr"/>
+            <a:r>
+              <a:rPr lang="en-US" sz="2400" dirty="0"/>
+              <a:t>KAKUMA </a:t>
+            </a:r>
+            <a:r>
+              <a:rPr lang="en-US" sz="2400" dirty="0" err="1"/>
+              <a:t>Azami</a:t>
+            </a:r>
+            <a:endParaRPr lang="en-US" sz="2400" dirty="0"/>
+          </a:p>
+          <a:p>
+            <a:pPr algn="ctr"/>
+            <a:r>
+              <a:rPr lang="en-US" sz="2400" dirty="0"/>
+              <a:t>195XXXXXXX</a:t>
+            </a:r>
+          </a:p>
+        </p:txBody>
+      </p:sp>
+      <p:sp>
+        <p:nvSpPr>
+          <p:cNvPr id="8" name="Arrow: Right 7">
+            <a:extLst>
+              <a:ext uri="{FF2B5EF4-FFF2-40B4-BE49-F238E27FC236}">
+                <a16:creationId xmlns:a16="http://schemas.microsoft.com/office/drawing/2014/main" id="{FCA04DA2-7F4F-4458-8DBD-99181B902F1B}"/>
+              </a:ext>
+            </a:extLst>
+          </p:cNvPr>
+          <p:cNvSpPr/>
+          <p:nvPr/>
+        </p:nvSpPr>
+        <p:spPr>
+          <a:xfrm>
+            <a:off x="4678274" y="2102267"/>
+            <a:ext cx="1218172" cy="632544"/>
+          </a:xfrm>
+          <a:prstGeom prst="rightArrow">
+            <a:avLst/>
+          </a:prstGeom>
+        </p:spPr>
+        <p:style>
+          <a:lnRef idx="2">
+            <a:schemeClr val="dk1">
+              <a:shade val="50000"/>
+            </a:schemeClr>
+          </a:lnRef>
+          <a:fillRef idx="1">
+            <a:schemeClr val="dk1"/>
+          </a:fillRef>
+          <a:effectRef idx="0">
+            <a:schemeClr val="dk1"/>
+          </a:effectRef>
+          <a:fontRef idx="minor">
+            <a:schemeClr val="lt1"/>
+          </a:fontRef>
+        </p:style>
+        <p:txBody>
+          <a:bodyPr rtlCol="0" anchor="ctr"/>
+          <a:lstStyle/>
+          <a:p>
+            <a:pPr algn="ctr"/>
+            <a:endParaRPr lang="en-US"/>
+          </a:p>
+        </p:txBody>
+      </p:sp>
+      <p:sp>
+        <p:nvSpPr>
+          <p:cNvPr id="9" name="TextBox 8">
+            <a:extLst>
+              <a:ext uri="{FF2B5EF4-FFF2-40B4-BE49-F238E27FC236}">
+                <a16:creationId xmlns:a16="http://schemas.microsoft.com/office/drawing/2014/main" id="{DEB22353-FBBF-4382-8F46-0E7A56577097}"/>
+              </a:ext>
+            </a:extLst>
+          </p:cNvPr>
+          <p:cNvSpPr txBox="1"/>
+          <p:nvPr/>
+        </p:nvSpPr>
+        <p:spPr>
+          <a:xfrm>
+            <a:off x="1308422" y="1690689"/>
+            <a:ext cx="3363985" cy="1415772"/>
+          </a:xfrm>
+          <a:prstGeom prst="rect">
+            <a:avLst/>
+          </a:prstGeom>
+        </p:spPr>
+        <p:style>
+          <a:lnRef idx="2">
+            <a:schemeClr val="dk1"/>
+          </a:lnRef>
+          <a:fillRef idx="1">
+            <a:schemeClr val="lt1"/>
+          </a:fillRef>
+          <a:effectRef idx="0">
+            <a:schemeClr val="dk1"/>
+          </a:effectRef>
+          <a:fontRef idx="minor">
+            <a:schemeClr val="dk1"/>
+          </a:fontRef>
+        </p:style>
+        <p:txBody>
+          <a:bodyPr wrap="square" rtlCol="0">
+            <a:spAutoFit/>
+          </a:bodyPr>
+          <a:lstStyle/>
+          <a:p>
+            <a:r>
+              <a:rPr lang="en-US" dirty="0"/>
+              <a:t>Write your name</a:t>
+            </a:r>
+            <a:br>
+              <a:rPr lang="en-US" dirty="0"/>
+            </a:br>
+            <a:r>
+              <a:rPr lang="en-US" dirty="0"/>
+              <a:t>* Kanji if you have one</a:t>
+            </a:r>
+            <a:br>
+              <a:rPr lang="en-US" dirty="0"/>
+            </a:br>
+            <a:r>
+              <a:rPr lang="en-US" dirty="0"/>
+              <a:t>* English </a:t>
+            </a:r>
+            <a:r>
+              <a:rPr lang="en-US" sz="1400" dirty="0"/>
+              <a:t>(first-last or last-first okay, but please write last name in CAPITALS)</a:t>
+            </a:r>
+          </a:p>
+          <a:p>
+            <a:r>
+              <a:rPr lang="en-US" dirty="0"/>
+              <a:t>* Full Student ID Number</a:t>
+            </a:r>
+            <a:endParaRPr lang="en-US" sz="2400" dirty="0"/>
+          </a:p>
+        </p:txBody>
+      </p:sp>
+      <p:sp>
+        <p:nvSpPr>
+          <p:cNvPr id="10" name="TextBox 9">
+            <a:extLst>
+              <a:ext uri="{FF2B5EF4-FFF2-40B4-BE49-F238E27FC236}">
+                <a16:creationId xmlns:a16="http://schemas.microsoft.com/office/drawing/2014/main" id="{2974C204-0F7F-428B-8F0F-A81CDFC6645E}"/>
+              </a:ext>
+            </a:extLst>
+          </p:cNvPr>
+          <p:cNvSpPr txBox="1"/>
+          <p:nvPr/>
+        </p:nvSpPr>
+        <p:spPr>
+          <a:xfrm>
+            <a:off x="956345" y="3238150"/>
+            <a:ext cx="7014116" cy="2308324"/>
+          </a:xfrm>
+          <a:prstGeom prst="rect">
+            <a:avLst/>
+          </a:prstGeom>
+          <a:noFill/>
+        </p:spPr>
+        <p:txBody>
+          <a:bodyPr wrap="square" rtlCol="0">
+            <a:spAutoFit/>
+          </a:bodyPr>
+          <a:lstStyle/>
+          <a:p>
+            <a:r>
+              <a:rPr lang="en-US" dirty="0"/>
+              <a:t>Write your answers in the paper.</a:t>
+            </a:r>
+          </a:p>
+          <a:p>
+            <a:r>
+              <a:rPr lang="ja-JP" altLang="en-US" dirty="0"/>
+              <a:t>紙に書いてください。</a:t>
+            </a:r>
+            <a:endParaRPr lang="en-US" dirty="0"/>
+          </a:p>
+          <a:p>
+            <a:r>
+              <a:rPr lang="en-US" dirty="0"/>
+              <a:t>Use pen only (do not use pencil), except diagrams and figures.</a:t>
+            </a:r>
+          </a:p>
+          <a:p>
+            <a:r>
+              <a:rPr lang="ja-JP" altLang="en-US" dirty="0"/>
+              <a:t>ペンのみ使ってください。図はえんぴつもＯＫです。</a:t>
+            </a:r>
+            <a:endParaRPr lang="en-US" dirty="0"/>
+          </a:p>
+          <a:p>
+            <a:r>
+              <a:rPr lang="en-US" dirty="0"/>
+              <a:t>SINCERELY attempt all questions, or your quiz will not be scored.</a:t>
+            </a:r>
+          </a:p>
+          <a:p>
+            <a:r>
+              <a:rPr lang="ja-JP" altLang="en-US" dirty="0"/>
+              <a:t>本気じゃないで答える場合は、クイズを採点しません。</a:t>
+            </a:r>
+            <a:endParaRPr lang="en-US" altLang="ja-JP" dirty="0"/>
+          </a:p>
+          <a:p>
+            <a:r>
+              <a:rPr lang="en-US" dirty="0"/>
+              <a:t>I may use your answer during class, but will not say whose answer it is.</a:t>
+            </a:r>
+          </a:p>
+          <a:p>
+            <a:r>
+              <a:rPr lang="ja-JP" altLang="en-US" dirty="0"/>
+              <a:t>あなたの答えを授業に使いますが、誰かのことは言えない。</a:t>
+            </a:r>
+            <a:endParaRPr lang="en-US" dirty="0"/>
+          </a:p>
+        </p:txBody>
+      </p:sp>
+      <p:sp>
+        <p:nvSpPr>
+          <p:cNvPr id="11" name="TextBox 10">
+            <a:extLst>
+              <a:ext uri="{FF2B5EF4-FFF2-40B4-BE49-F238E27FC236}">
+                <a16:creationId xmlns:a16="http://schemas.microsoft.com/office/drawing/2014/main" id="{68E1FBEE-3C4A-4C3A-9DEB-7AE94B6B6887}"/>
+              </a:ext>
+            </a:extLst>
+          </p:cNvPr>
+          <p:cNvSpPr txBox="1"/>
+          <p:nvPr/>
+        </p:nvSpPr>
+        <p:spPr>
+          <a:xfrm>
+            <a:off x="1259581" y="5609971"/>
+            <a:ext cx="6825651" cy="954107"/>
+          </a:xfrm>
+          <a:prstGeom prst="rect">
+            <a:avLst/>
+          </a:prstGeom>
+          <a:noFill/>
+        </p:spPr>
+        <p:txBody>
+          <a:bodyPr wrap="none" rtlCol="0">
+            <a:spAutoFit/>
+          </a:bodyPr>
+          <a:lstStyle/>
+          <a:p>
+            <a:pPr algn="ctr"/>
+            <a:r>
+              <a:rPr lang="en-US" sz="2800" dirty="0"/>
+              <a:t>TIME LIMIT: </a:t>
+            </a:r>
+            <a:r>
+              <a:rPr lang="en-US" sz="2800" dirty="0">
+                <a:solidFill>
+                  <a:srgbClr val="FF0000"/>
+                </a:solidFill>
+              </a:rPr>
+              <a:t>5 MINUTES AFTER CLASS STARTS</a:t>
+            </a:r>
+            <a:r>
+              <a:rPr lang="en-US" sz="2800" dirty="0"/>
+              <a:t>!</a:t>
+            </a:r>
+          </a:p>
+          <a:p>
+            <a:pPr algn="ctr"/>
+            <a:r>
+              <a:rPr lang="ja-JP" altLang="en-US" sz="2800" dirty="0"/>
+              <a:t>時間</a:t>
+            </a:r>
+            <a:r>
+              <a:rPr lang="en-US" altLang="ja-JP" sz="2800" dirty="0"/>
+              <a:t>:</a:t>
+            </a:r>
+            <a:r>
+              <a:rPr lang="ja-JP" altLang="en-US" sz="2800" dirty="0"/>
+              <a:t> 授業開始後</a:t>
+            </a:r>
+            <a:r>
+              <a:rPr lang="en-US" altLang="ja-JP" sz="2800" dirty="0"/>
+              <a:t>5</a:t>
+            </a:r>
+            <a:r>
+              <a:rPr lang="ja-JP" altLang="en-US" sz="2800" dirty="0"/>
+              <a:t>分まで！</a:t>
+            </a:r>
+            <a:endParaRPr lang="en-US" sz="2800" dirty="0"/>
+          </a:p>
+        </p:txBody>
+      </p:sp>
+      <p:sp>
+        <p:nvSpPr>
+          <p:cNvPr id="3" name="Slide Number Placeholder 2">
+            <a:extLst>
+              <a:ext uri="{FF2B5EF4-FFF2-40B4-BE49-F238E27FC236}">
+                <a16:creationId xmlns:a16="http://schemas.microsoft.com/office/drawing/2014/main" id="{6A767221-5713-4391-85B7-0BFB740BCD96}"/>
+              </a:ext>
+            </a:extLst>
+          </p:cNvPr>
+          <p:cNvSpPr>
+            <a:spLocks noGrp="1"/>
+          </p:cNvSpPr>
+          <p:nvPr>
+            <p:ph type="sldNum" sz="quarter" idx="12"/>
+          </p:nvPr>
+        </p:nvSpPr>
+        <p:spPr/>
+        <p:txBody>
+          <a:bodyPr/>
+          <a:lstStyle/>
+          <a:p>
+            <a:fld id="{0B02C7C3-1F9D-495C-A818-668CCDC0E8E2}" type="slidenum">
+              <a:rPr lang="en-US" smtClean="0"/>
+              <a:t>10</a:t>
+            </a:fld>
+            <a:endParaRPr lang="en-US"/>
+          </a:p>
+        </p:txBody>
+      </p:sp>
+    </p:spTree>
+    <p:extLst>
+      <p:ext uri="{BB962C8B-B14F-4D97-AF65-F5344CB8AC3E}">
+        <p14:creationId xmlns:p14="http://schemas.microsoft.com/office/powerpoint/2010/main" val="1635902425"/>
+      </p:ext>
+    </p:extLst>
+  </p:cSld>
+  <p:clrMapOvr>
+    <a:masterClrMapping/>
+  </p:clrMapOvr>
+</p:sld>
+</file>
+
+<file path=ppt/slides/slide11.xml><?xml version="1.0" encoding="utf-8"?>
+<p:sld xmlns:a="http://schemas.openxmlformats.org/drawingml/2006/main" xmlns:r="http://schemas.openxmlformats.org/officeDocument/2006/relationships" xmlns:p="http://schemas.openxmlformats.org/presentationml/2006/main">
+  <p:cSld>
+    <p:spTree>
+      <p:nvGrpSpPr>
+        <p:cNvPr id="1" name=""/>
+        <p:cNvGrpSpPr/>
+        <p:nvPr/>
+      </p:nvGrpSpPr>
+      <p:grpSpPr>
+        <a:xfrm>
+          <a:off x="0" y="0"/>
+          <a:ext cx="0" cy="0"/>
+          <a:chOff x="0" y="0"/>
+          <a:chExt cx="0" cy="0"/>
+        </a:xfrm>
+      </p:grpSpPr>
+      <p:sp>
+        <p:nvSpPr>
+          <p:cNvPr id="2" name="Title 1">
+            <a:extLst>
+              <a:ext uri="{FF2B5EF4-FFF2-40B4-BE49-F238E27FC236}">
                 <a16:creationId xmlns:a16="http://schemas.microsoft.com/office/drawing/2014/main" id="{395204A4-E77A-493D-AA5D-F51C6CE89E62}"/>
               </a:ext>
             </a:extLst>
@@ -25951,7 +26448,7 @@
           <a:p>
             <a:fld id="{0B02C7C3-1F9D-495C-A818-668CCDC0E8E2}" type="slidenum">
               <a:rPr lang="en-US" smtClean="0"/>
-              <a:t>10</a:t>
+              <a:t>11</a:t>
             </a:fld>
             <a:endParaRPr lang="en-US"/>
           </a:p>
@@ -25970,7 +26467,7 @@
 </p:sld>
 </file>
 
-<file path=ppt/slides/slide11.xml><?xml version="1.0" encoding="utf-8"?>
+<file path=ppt/slides/slide12.xml><?xml version="1.0" encoding="utf-8"?>
 <p:sld xmlns:a="http://schemas.openxmlformats.org/drawingml/2006/main" xmlns:r="http://schemas.openxmlformats.org/officeDocument/2006/relationships" xmlns:p="http://schemas.openxmlformats.org/presentationml/2006/main" show="0">
   <p:cSld>
     <p:spTree>
@@ -26141,7 +26638,7 @@
           <a:p>
             <a:fld id="{0B02C7C3-1F9D-495C-A818-668CCDC0E8E2}" type="slidenum">
               <a:rPr lang="en-US" smtClean="0"/>
-              <a:t>11</a:t>
+              <a:t>12</a:t>
             </a:fld>
             <a:endParaRPr lang="en-US" dirty="0"/>
           </a:p>
@@ -26161,7 +26658,7 @@
 </file>
 
 <file path=ppt/slides/slide2.xml><?xml version="1.0" encoding="utf-8"?>
-<p:sld xmlns:a="http://schemas.openxmlformats.org/drawingml/2006/main" xmlns:r="http://schemas.openxmlformats.org/officeDocument/2006/relationships" xmlns:p="http://schemas.openxmlformats.org/presentationml/2006/main">
+<p:sld xmlns:a="http://schemas.openxmlformats.org/drawingml/2006/main" xmlns:r="http://schemas.openxmlformats.org/officeDocument/2006/relationships" xmlns:p="http://schemas.openxmlformats.org/presentationml/2006/main" show="0">
   <p:cSld>
     <p:bg>
       <p:bgPr>
@@ -26879,6 +27376,478 @@
 <file path=ppt/slides/slide3.xml><?xml version="1.0" encoding="utf-8"?>
 <p:sld xmlns:a="http://schemas.openxmlformats.org/drawingml/2006/main" xmlns:r="http://schemas.openxmlformats.org/officeDocument/2006/relationships" xmlns:p="http://schemas.openxmlformats.org/presentationml/2006/main">
   <p:cSld>
+    <p:bg>
+      <p:bgPr>
+        <a:solidFill>
+          <a:schemeClr val="bg1"/>
+        </a:solidFill>
+        <a:effectLst/>
+      </p:bgPr>
+    </p:bg>
+    <p:spTree>
+      <p:nvGrpSpPr>
+        <p:cNvPr id="1" name=""/>
+        <p:cNvGrpSpPr/>
+        <p:nvPr/>
+      </p:nvGrpSpPr>
+      <p:grpSpPr>
+        <a:xfrm>
+          <a:off x="0" y="0"/>
+          <a:ext cx="0" cy="0"/>
+          <a:chOff x="0" y="0"/>
+          <a:chExt cx="0" cy="0"/>
+        </a:xfrm>
+      </p:grpSpPr>
+      <p:pic>
+        <p:nvPicPr>
+          <p:cNvPr id="4" name="Picture 3">
+            <a:extLst>
+              <a:ext uri="{FF2B5EF4-FFF2-40B4-BE49-F238E27FC236}">
+                <a16:creationId xmlns:a16="http://schemas.microsoft.com/office/drawing/2014/main" id="{626FF1FC-6C52-423E-9075-1B304653A527}"/>
+              </a:ext>
+            </a:extLst>
+          </p:cNvPr>
+          <p:cNvPicPr>
+            <a:picLocks noChangeAspect="1"/>
+          </p:cNvPicPr>
+          <p:nvPr/>
+        </p:nvPicPr>
+        <p:blipFill rotWithShape="1">
+          <a:blip r:embed="rId2"/>
+          <a:srcRect l="-1" t="1" r="-153" b="1"/>
+          <a:stretch/>
+        </p:blipFill>
+        <p:spPr>
+          <a:xfrm>
+            <a:off x="20" y="10"/>
+            <a:ext cx="9143980" cy="4199762"/>
+          </a:xfrm>
+          <a:prstGeom prst="rect">
+            <a:avLst/>
+          </a:prstGeom>
+        </p:spPr>
+      </p:pic>
+      <p:pic>
+        <p:nvPicPr>
+          <p:cNvPr id="9" name="Picture 8">
+            <a:extLst>
+              <a:ext uri="{FF2B5EF4-FFF2-40B4-BE49-F238E27FC236}">
+                <a16:creationId xmlns:a16="http://schemas.microsoft.com/office/drawing/2014/main" id="{EE09A529-E47C-4634-BB98-0A9526C372B4}"/>
+              </a:ext>
+              <a:ext uri="{C183D7F6-B498-43B3-948B-1728B52AA6E4}">
+                <adec:decorative xmlns:adec="http://schemas.microsoft.com/office/drawing/2017/decorative" val="1"/>
+              </a:ext>
+            </a:extLst>
+          </p:cNvPr>
+          <p:cNvPicPr>
+            <a:picLocks noGrp="1" noRot="1" noChangeAspect="1" noMove="1" noResize="1" noEditPoints="1" noAdjustHandles="1" noChangeArrowheads="1" noChangeShapeType="1" noCrop="1"/>
+          </p:cNvPicPr>
+          <p:nvPr>
+            <p:extLst>
+              <p:ext uri="{386F3935-93C4-4BCD-93E2-E3B085C9AB24}">
+                <p16:designElem xmlns:p16="http://schemas.microsoft.com/office/powerpoint/2015/main" val="1"/>
+              </p:ext>
+            </p:extLst>
+          </p:nvPr>
+        </p:nvPicPr>
+        <p:blipFill>
+          <a:blip r:embed="rId3">
+            <a:extLst>
+              <a:ext uri="{28A0092B-C50C-407E-A947-70E740481C1C}">
+                <a14:useLocalDpi xmlns:a14="http://schemas.microsoft.com/office/drawing/2010/main" val="0"/>
+              </a:ext>
+            </a:extLst>
+          </a:blip>
+          <a:stretch>
+            <a:fillRect/>
+          </a:stretch>
+        </p:blipFill>
+        <p:spPr>
+          <a:xfrm>
+            <a:off x="0" y="0"/>
+            <a:ext cx="9144000" cy="6858000"/>
+          </a:xfrm>
+          <a:prstGeom prst="rect">
+            <a:avLst/>
+          </a:prstGeom>
+        </p:spPr>
+      </p:pic>
+      <p:sp>
+        <p:nvSpPr>
+          <p:cNvPr id="11" name="Oval 10">
+            <a:extLst>
+              <a:ext uri="{FF2B5EF4-FFF2-40B4-BE49-F238E27FC236}">
+                <a16:creationId xmlns:a16="http://schemas.microsoft.com/office/drawing/2014/main" id="{569C1A01-6FB5-43CE-ADCC-936728ACAC0D}"/>
+              </a:ext>
+              <a:ext uri="{C183D7F6-B498-43B3-948B-1728B52AA6E4}">
+                <adec:decorative xmlns:adec="http://schemas.microsoft.com/office/drawing/2017/decorative" val="1"/>
+              </a:ext>
+            </a:extLst>
+          </p:cNvPr>
+          <p:cNvSpPr>
+            <a:spLocks noGrp="1" noRot="1" noChangeAspect="1" noMove="1" noResize="1" noEditPoints="1" noAdjustHandles="1" noChangeArrowheads="1" noChangeShapeType="1" noTextEdit="1"/>
+          </p:cNvSpPr>
+          <p:nvPr>
+            <p:extLst>
+              <p:ext uri="{386F3935-93C4-4BCD-93E2-E3B085C9AB24}">
+                <p16:designElem xmlns:p16="http://schemas.microsoft.com/office/powerpoint/2015/main" val="1"/>
+              </p:ext>
+            </p:extLst>
+          </p:nvPr>
+        </p:nvSpPr>
+        <p:spPr>
+          <a:xfrm>
+            <a:off x="1092200" y="4388303"/>
+            <a:ext cx="618067" cy="702986"/>
+          </a:xfrm>
+          <a:prstGeom prst="ellipse">
+            <a:avLst/>
+          </a:prstGeom>
+          <a:solidFill>
+            <a:srgbClr val="FFFFFF"/>
+          </a:solidFill>
+          <a:ln>
+            <a:noFill/>
+          </a:ln>
+        </p:spPr>
+        <p:style>
+          <a:lnRef idx="2">
+            <a:schemeClr val="accent1">
+              <a:shade val="50000"/>
+            </a:schemeClr>
+          </a:lnRef>
+          <a:fillRef idx="1">
+            <a:schemeClr val="accent1"/>
+          </a:fillRef>
+          <a:effectRef idx="0">
+            <a:schemeClr val="accent1"/>
+          </a:effectRef>
+          <a:fontRef idx="minor">
+            <a:schemeClr val="lt1"/>
+          </a:fontRef>
+        </p:style>
+        <p:txBody>
+          <a:bodyPr rtlCol="0" anchor="ctr"/>
+          <a:lstStyle/>
+          <a:p>
+            <a:pPr algn="ctr"/>
+            <a:endParaRPr lang="en-US"/>
+          </a:p>
+        </p:txBody>
+      </p:sp>
+      <p:sp>
+        <p:nvSpPr>
+          <p:cNvPr id="2" name="Title 1">
+            <a:extLst>
+              <a:ext uri="{FF2B5EF4-FFF2-40B4-BE49-F238E27FC236}">
+                <a16:creationId xmlns:a16="http://schemas.microsoft.com/office/drawing/2014/main" id="{63866B06-97DD-4886-92B6-91CCD94F4E03}"/>
+              </a:ext>
+            </a:extLst>
+          </p:cNvPr>
+          <p:cNvSpPr>
+            <a:spLocks noGrp="1"/>
+          </p:cNvSpPr>
+          <p:nvPr>
+            <p:ph type="title"/>
+          </p:nvPr>
+        </p:nvSpPr>
+        <p:spPr>
+          <a:xfrm>
+            <a:off x="595618" y="4805279"/>
+            <a:ext cx="3369016" cy="1509931"/>
+          </a:xfrm>
+        </p:spPr>
+        <p:txBody>
+          <a:bodyPr>
+            <a:normAutofit/>
+          </a:bodyPr>
+          <a:lstStyle/>
+          <a:p>
+            <a:r>
+              <a:rPr lang="en-US" sz="3500" dirty="0">
+                <a:solidFill>
+                  <a:srgbClr val="000000"/>
+                </a:solidFill>
+              </a:rPr>
+              <a:t>Class Time &amp; Location</a:t>
+            </a:r>
+          </a:p>
+        </p:txBody>
+      </p:sp>
+      <p:sp>
+        <p:nvSpPr>
+          <p:cNvPr id="3" name="Content Placeholder 2">
+            <a:extLst>
+              <a:ext uri="{FF2B5EF4-FFF2-40B4-BE49-F238E27FC236}">
+                <a16:creationId xmlns:a16="http://schemas.microsoft.com/office/drawing/2014/main" id="{3FF00D51-084D-402E-B319-003163F86895}"/>
+              </a:ext>
+            </a:extLst>
+          </p:cNvPr>
+          <p:cNvSpPr>
+            <a:spLocks noGrp="1"/>
+          </p:cNvSpPr>
+          <p:nvPr>
+            <p:ph idx="1"/>
+          </p:nvPr>
+        </p:nvSpPr>
+        <p:spPr>
+          <a:xfrm>
+            <a:off x="3246539" y="4388303"/>
+            <a:ext cx="5699164" cy="2264167"/>
+          </a:xfrm>
+        </p:spPr>
+        <p:txBody>
+          <a:bodyPr anchor="ctr">
+            <a:normAutofit lnSpcReduction="10000"/>
+          </a:bodyPr>
+          <a:lstStyle/>
+          <a:p>
+            <a:r>
+              <a:rPr lang="en-US" sz="2000" b="1" dirty="0">
+                <a:solidFill>
+                  <a:srgbClr val="FF0000"/>
+                </a:solidFill>
+              </a:rPr>
+              <a:t>Tuesdays Period 3</a:t>
+            </a:r>
+          </a:p>
+          <a:p>
+            <a:r>
+              <a:rPr lang="en-US" sz="2000" dirty="0">
+                <a:solidFill>
+                  <a:srgbClr val="000000"/>
+                </a:solidFill>
+              </a:rPr>
+              <a:t>This class is strictly online. Officially, I work at Information Media Center (IMC / </a:t>
+            </a:r>
+            <a:r>
+              <a:rPr lang="ja-JP" altLang="en-US" sz="2000" dirty="0">
+                <a:solidFill>
+                  <a:srgbClr val="000000"/>
+                </a:solidFill>
+              </a:rPr>
+              <a:t>総合メディア基盤センター</a:t>
+            </a:r>
+            <a:r>
+              <a:rPr lang="en-US" sz="2000" dirty="0">
+                <a:solidFill>
+                  <a:srgbClr val="000000"/>
+                </a:solidFill>
+              </a:rPr>
+              <a:t>), C2 in the map.</a:t>
+            </a:r>
+          </a:p>
+          <a:p>
+            <a:r>
+              <a:rPr lang="en-US" sz="2000" dirty="0">
+                <a:solidFill>
+                  <a:srgbClr val="000000"/>
+                </a:solidFill>
+              </a:rPr>
+              <a:t>Currently, direct visit to IMC is prohibited. For this class, Office Hours is strictly for students with physical (hardware) projects.</a:t>
+            </a:r>
+          </a:p>
+        </p:txBody>
+      </p:sp>
+      <p:sp>
+        <p:nvSpPr>
+          <p:cNvPr id="8" name="Oval 7">
+            <a:extLst>
+              <a:ext uri="{FF2B5EF4-FFF2-40B4-BE49-F238E27FC236}">
+                <a16:creationId xmlns:a16="http://schemas.microsoft.com/office/drawing/2014/main" id="{0B164138-514B-4763-8D28-6B61E0E52189}"/>
+              </a:ext>
+            </a:extLst>
+          </p:cNvPr>
+          <p:cNvSpPr/>
+          <p:nvPr/>
+        </p:nvSpPr>
+        <p:spPr>
+          <a:xfrm>
+            <a:off x="5568076" y="2146065"/>
+            <a:ext cx="855677" cy="855677"/>
+          </a:xfrm>
+          <a:prstGeom prst="ellipse">
+            <a:avLst/>
+          </a:prstGeom>
+          <a:noFill/>
+          <a:ln w="76200">
+            <a:solidFill>
+              <a:srgbClr val="FF0000"/>
+            </a:solidFill>
+          </a:ln>
+          <a:effectLst>
+            <a:glow rad="63500">
+              <a:schemeClr val="accent4">
+                <a:satMod val="175000"/>
+                <a:alpha val="40000"/>
+              </a:schemeClr>
+            </a:glow>
+          </a:effectLst>
+        </p:spPr>
+        <p:style>
+          <a:lnRef idx="2">
+            <a:schemeClr val="accent1">
+              <a:shade val="50000"/>
+            </a:schemeClr>
+          </a:lnRef>
+          <a:fillRef idx="1">
+            <a:schemeClr val="accent1"/>
+          </a:fillRef>
+          <a:effectRef idx="0">
+            <a:schemeClr val="accent1"/>
+          </a:effectRef>
+          <a:fontRef idx="minor">
+            <a:schemeClr val="lt1"/>
+          </a:fontRef>
+        </p:style>
+        <p:txBody>
+          <a:bodyPr rtlCol="0" anchor="ctr"/>
+          <a:lstStyle/>
+          <a:p>
+            <a:pPr algn="ctr"/>
+            <a:endParaRPr lang="en-US"/>
+          </a:p>
+        </p:txBody>
+      </p:sp>
+      <p:sp>
+        <p:nvSpPr>
+          <p:cNvPr id="7" name="Slide Number Placeholder 6">
+            <a:extLst>
+              <a:ext uri="{FF2B5EF4-FFF2-40B4-BE49-F238E27FC236}">
+                <a16:creationId xmlns:a16="http://schemas.microsoft.com/office/drawing/2014/main" id="{5DCCBE2E-5792-4B70-9580-668D5CA92863}"/>
+              </a:ext>
+            </a:extLst>
+          </p:cNvPr>
+          <p:cNvSpPr>
+            <a:spLocks noGrp="1"/>
+          </p:cNvSpPr>
+          <p:nvPr>
+            <p:ph type="sldNum" sz="quarter" idx="12"/>
+          </p:nvPr>
+        </p:nvSpPr>
+        <p:spPr/>
+        <p:txBody>
+          <a:bodyPr/>
+          <a:lstStyle/>
+          <a:p>
+            <a:fld id="{0B02C7C3-1F9D-495C-A818-668CCDC0E8E2}" type="slidenum">
+              <a:rPr lang="en-US" smtClean="0">
+                <a:solidFill>
+                  <a:srgbClr val="0070C0"/>
+                </a:solidFill>
+              </a:rPr>
+              <a:t>3</a:t>
+            </a:fld>
+            <a:endParaRPr lang="en-US" dirty="0">
+              <a:solidFill>
+                <a:srgbClr val="0070C0"/>
+              </a:solidFill>
+            </a:endParaRPr>
+          </a:p>
+        </p:txBody>
+      </p:sp>
+    </p:spTree>
+    <p:extLst>
+      <p:ext uri="{BB962C8B-B14F-4D97-AF65-F5344CB8AC3E}">
+        <p14:creationId xmlns:p14="http://schemas.microsoft.com/office/powerpoint/2010/main" val="3930388698"/>
+      </p:ext>
+    </p:extLst>
+  </p:cSld>
+  <p:clrMapOvr>
+    <a:masterClrMapping/>
+  </p:clrMapOvr>
+  <p:timing>
+    <p:tnLst>
+      <p:par>
+        <p:cTn id="1" dur="indefinite" restart="never" nodeType="tmRoot">
+          <p:childTnLst>
+            <p:seq concurrent="1" nextAc="seek">
+              <p:cTn id="2" dur="indefinite" nodeType="mainSeq">
+                <p:childTnLst>
+                  <p:par>
+                    <p:cTn id="3" fill="hold">
+                      <p:stCondLst>
+                        <p:cond delay="indefinite"/>
+                      </p:stCondLst>
+                      <p:childTnLst>
+                        <p:par>
+                          <p:cTn id="4" fill="hold">
+                            <p:stCondLst>
+                              <p:cond delay="0"/>
+                            </p:stCondLst>
+                            <p:childTnLst>
+                              <p:par>
+                                <p:cTn id="5" presetID="21" presetClass="entr" presetSubtype="1" fill="hold" grpId="0" nodeType="clickEffect">
+                                  <p:stCondLst>
+                                    <p:cond delay="0"/>
+                                  </p:stCondLst>
+                                  <p:childTnLst>
+                                    <p:set>
+                                      <p:cBhvr>
+                                        <p:cTn id="6" dur="1" fill="hold">
+                                          <p:stCondLst>
+                                            <p:cond delay="0"/>
+                                          </p:stCondLst>
+                                        </p:cTn>
+                                        <p:tgtEl>
+                                          <p:spTgt spid="8"/>
+                                        </p:tgtEl>
+                                        <p:attrNameLst>
+                                          <p:attrName>style.visibility</p:attrName>
+                                        </p:attrNameLst>
+                                      </p:cBhvr>
+                                      <p:to>
+                                        <p:strVal val="visible"/>
+                                      </p:to>
+                                    </p:set>
+                                    <p:animEffect transition="in" filter="wheel(1)">
+                                      <p:cBhvr>
+                                        <p:cTn id="7" dur="1000"/>
+                                        <p:tgtEl>
+                                          <p:spTgt spid="8"/>
+                                        </p:tgtEl>
+                                      </p:cBhvr>
+                                    </p:animEffect>
+                                  </p:childTnLst>
+                                </p:cTn>
+                              </p:par>
+                            </p:childTnLst>
+                          </p:cTn>
+                        </p:par>
+                      </p:childTnLst>
+                    </p:cTn>
+                  </p:par>
+                </p:childTnLst>
+              </p:cTn>
+              <p:prevCondLst>
+                <p:cond evt="onPrev" delay="0">
+                  <p:tgtEl>
+                    <p:sldTgt/>
+                  </p:tgtEl>
+                </p:cond>
+              </p:prevCondLst>
+              <p:nextCondLst>
+                <p:cond evt="onNext" delay="0">
+                  <p:tgtEl>
+                    <p:sldTgt/>
+                  </p:tgtEl>
+                </p:cond>
+              </p:nextCondLst>
+            </p:seq>
+          </p:childTnLst>
+        </p:cTn>
+      </p:par>
+    </p:tnLst>
+    <p:bldLst>
+      <p:bldP spid="8" grpId="0" animBg="1"/>
+    </p:bldLst>
+  </p:timing>
+</p:sld>
+</file>
+
+<file path=ppt/slides/slide4.xml><?xml version="1.0" encoding="utf-8"?>
+<p:sld xmlns:a="http://schemas.openxmlformats.org/drawingml/2006/main" xmlns:r="http://schemas.openxmlformats.org/officeDocument/2006/relationships" xmlns:p="http://schemas.openxmlformats.org/presentationml/2006/main">
+  <p:cSld>
     <p:spTree>
       <p:nvGrpSpPr>
         <p:cNvPr id="1" name=""/>
@@ -26977,7 +27946,7 @@
           <a:p>
             <a:fld id="{0B02C7C3-1F9D-495C-A818-668CCDC0E8E2}" type="slidenum">
               <a:rPr lang="en-US" smtClean="0"/>
-              <a:t>3</a:t>
+              <a:t>4</a:t>
             </a:fld>
             <a:endParaRPr lang="en-US"/>
           </a:p>
@@ -27983,7 +28952,7 @@
 </p:sld>
 </file>
 
-<file path=ppt/slides/slide4.xml><?xml version="1.0" encoding="utf-8"?>
+<file path=ppt/slides/slide5.xml><?xml version="1.0" encoding="utf-8"?>
 <p:sld xmlns:a="http://schemas.openxmlformats.org/drawingml/2006/main" xmlns:r="http://schemas.openxmlformats.org/officeDocument/2006/relationships" xmlns:p="http://schemas.openxmlformats.org/presentationml/2006/main">
   <p:cSld>
     <p:spTree>
@@ -28082,7 +29051,7 @@
           <a:p>
             <a:fld id="{0B02C7C3-1F9D-495C-A818-668CCDC0E8E2}" type="slidenum">
               <a:rPr lang="en-US" smtClean="0"/>
-              <a:t>4</a:t>
+              <a:t>5</a:t>
             </a:fld>
             <a:endParaRPr lang="en-US"/>
           </a:p>
@@ -28101,7 +29070,7 @@
 </p:sld>
 </file>
 
-<file path=ppt/slides/slide5.xml><?xml version="1.0" encoding="utf-8"?>
+<file path=ppt/slides/slide6.xml><?xml version="1.0" encoding="utf-8"?>
 <p:sld xmlns:a="http://schemas.openxmlformats.org/drawingml/2006/main" xmlns:r="http://schemas.openxmlformats.org/officeDocument/2006/relationships" xmlns:p="http://schemas.openxmlformats.org/presentationml/2006/main">
   <p:cSld>
     <p:spTree>
@@ -28206,7 +29175,7 @@
                   <a:srgbClr val="C00000"/>
                 </a:solidFill>
               </a:rPr>
-              <a:t>5</a:t>
+              <a:t>6</a:t>
             </a:fld>
             <a:endParaRPr lang="en-US" dirty="0">
               <a:solidFill>
@@ -28229,7 +29198,7 @@
 </p:sld>
 </file>
 
-<file path=ppt/slides/slide6.xml><?xml version="1.0" encoding="utf-8"?>
+<file path=ppt/slides/slide7.xml><?xml version="1.0" encoding="utf-8"?>
 <p:sld xmlns:a="http://schemas.openxmlformats.org/drawingml/2006/main" xmlns:r="http://schemas.openxmlformats.org/officeDocument/2006/relationships" xmlns:p="http://schemas.openxmlformats.org/presentationml/2006/main">
   <p:cSld>
     <p:bg>
@@ -28386,7 +29355,7 @@
                   <a:srgbClr val="C00000"/>
                 </a:solidFill>
               </a:rPr>
-              <a:t>6</a:t>
+              <a:t>7</a:t>
             </a:fld>
             <a:endParaRPr lang="en-US">
               <a:solidFill>
@@ -28409,7 +29378,7 @@
 </p:sld>
 </file>
 
-<file path=ppt/slides/slide7.xml><?xml version="1.0" encoding="utf-8"?>
+<file path=ppt/slides/slide8.xml><?xml version="1.0" encoding="utf-8"?>
 <p:sld xmlns:a="http://schemas.openxmlformats.org/drawingml/2006/main" xmlns:r="http://schemas.openxmlformats.org/officeDocument/2006/relationships" xmlns:p="http://schemas.openxmlformats.org/presentationml/2006/main">
   <p:cSld>
     <p:spTree>
@@ -28451,15 +29420,15 @@
           <a:p>
             <a:r>
               <a:rPr lang="en-US" sz="4000" dirty="0"/>
-              <a:t>This is my 1</a:t>
+              <a:t>I believe in </a:t>
             </a:r>
             <a:r>
-              <a:rPr lang="en-US" sz="4000" baseline="30000" dirty="0"/>
-              <a:t>st</a:t>
+              <a:rPr lang="en-US" sz="4000" b="1" dirty="0"/>
+              <a:t>talking</a:t>
             </a:r>
             <a:r>
               <a:rPr lang="en-US" sz="4000" dirty="0"/>
-              <a:t> Class. Let me know if:</a:t>
+              <a:t>! Let me know if:</a:t>
             </a:r>
           </a:p>
         </p:txBody>
@@ -28513,7 +29482,7 @@
           <a:p>
             <a:fld id="{0B02C7C3-1F9D-495C-A818-668CCDC0E8E2}" type="slidenum">
               <a:rPr lang="en-US" smtClean="0"/>
-              <a:t>7</a:t>
+              <a:t>8</a:t>
             </a:fld>
             <a:endParaRPr lang="en-US"/>
           </a:p>
@@ -28532,7 +29501,7 @@
 </p:sld>
 </file>
 
-<file path=ppt/slides/slide8.xml><?xml version="1.0" encoding="utf-8"?>
+<file path=ppt/slides/slide9.xml><?xml version="1.0" encoding="utf-8"?>
 <p:sld xmlns:a="http://schemas.openxmlformats.org/drawingml/2006/main" xmlns:r="http://schemas.openxmlformats.org/officeDocument/2006/relationships" xmlns:p="http://schemas.openxmlformats.org/presentationml/2006/main">
   <p:cSld>
     <p:spTree>
@@ -29225,7 +30194,7 @@
           <a:p>
             <a:fld id="{0B02C7C3-1F9D-495C-A818-668CCDC0E8E2}" type="slidenum">
               <a:rPr lang="en-US" smtClean="0"/>
-              <a:t>8</a:t>
+              <a:t>9</a:t>
             </a:fld>
             <a:endParaRPr lang="en-US"/>
           </a:p>
@@ -30249,502 +31218,6 @@
 </p:sld>
 </file>
 
-<file path=ppt/slides/slide9.xml><?xml version="1.0" encoding="utf-8"?>
-<p:sld xmlns:a="http://schemas.openxmlformats.org/drawingml/2006/main" xmlns:r="http://schemas.openxmlformats.org/officeDocument/2006/relationships" xmlns:p="http://schemas.openxmlformats.org/presentationml/2006/main">
-  <p:cSld>
-    <p:spTree>
-      <p:nvGrpSpPr>
-        <p:cNvPr id="1" name=""/>
-        <p:cNvGrpSpPr/>
-        <p:nvPr/>
-      </p:nvGrpSpPr>
-      <p:grpSpPr>
-        <a:xfrm>
-          <a:off x="0" y="0"/>
-          <a:ext cx="0" cy="0"/>
-          <a:chOff x="0" y="0"/>
-          <a:chExt cx="0" cy="0"/>
-        </a:xfrm>
-      </p:grpSpPr>
-      <p:sp>
-        <p:nvSpPr>
-          <p:cNvPr id="2" name="Title 1">
-            <a:extLst>
-              <a:ext uri="{FF2B5EF4-FFF2-40B4-BE49-F238E27FC236}">
-                <a16:creationId xmlns:a16="http://schemas.microsoft.com/office/drawing/2014/main" id="{D44D1E58-3772-4F2A-BA68-96DC4C4E44A8}"/>
-              </a:ext>
-            </a:extLst>
-          </p:cNvPr>
-          <p:cNvSpPr>
-            <a:spLocks noGrp="1"/>
-          </p:cNvSpPr>
-          <p:nvPr>
-            <p:ph type="title"/>
-          </p:nvPr>
-        </p:nvSpPr>
-        <p:spPr/>
-        <p:txBody>
-          <a:bodyPr/>
-          <a:lstStyle/>
-          <a:p>
-            <a:r>
-              <a:rPr lang="en-US" dirty="0"/>
-              <a:t>Pre-Lesson Quiz: How To</a:t>
-            </a:r>
-          </a:p>
-        </p:txBody>
-      </p:sp>
-      <p:sp>
-        <p:nvSpPr>
-          <p:cNvPr id="4" name="Rectangle 3">
-            <a:extLst>
-              <a:ext uri="{FF2B5EF4-FFF2-40B4-BE49-F238E27FC236}">
-                <a16:creationId xmlns:a16="http://schemas.microsoft.com/office/drawing/2014/main" id="{90CCD120-BE71-4378-9E78-78595DCA57D8}"/>
-              </a:ext>
-            </a:extLst>
-          </p:cNvPr>
-          <p:cNvSpPr/>
-          <p:nvPr/>
-        </p:nvSpPr>
-        <p:spPr>
-          <a:xfrm>
-            <a:off x="721453" y="1593909"/>
-            <a:ext cx="7617204" cy="4016062"/>
-          </a:xfrm>
-          <a:prstGeom prst="rect">
-            <a:avLst/>
-          </a:prstGeom>
-          <a:solidFill>
-            <a:schemeClr val="accent4">
-              <a:lumMod val="20000"/>
-              <a:lumOff val="80000"/>
-            </a:schemeClr>
-          </a:solidFill>
-        </p:spPr>
-        <p:style>
-          <a:lnRef idx="2">
-            <a:schemeClr val="accent4">
-              <a:shade val="50000"/>
-            </a:schemeClr>
-          </a:lnRef>
-          <a:fillRef idx="1">
-            <a:schemeClr val="accent4"/>
-          </a:fillRef>
-          <a:effectRef idx="0">
-            <a:schemeClr val="accent4"/>
-          </a:effectRef>
-          <a:fontRef idx="minor">
-            <a:schemeClr val="lt1"/>
-          </a:fontRef>
-        </p:style>
-        <p:txBody>
-          <a:bodyPr rtlCol="0" anchor="ctr"/>
-          <a:lstStyle/>
-          <a:p>
-            <a:pPr algn="ctr"/>
-            <a:endParaRPr lang="en-US" dirty="0"/>
-          </a:p>
-        </p:txBody>
-      </p:sp>
-      <p:sp>
-        <p:nvSpPr>
-          <p:cNvPr id="5" name="TextBox 4">
-            <a:extLst>
-              <a:ext uri="{FF2B5EF4-FFF2-40B4-BE49-F238E27FC236}">
-                <a16:creationId xmlns:a16="http://schemas.microsoft.com/office/drawing/2014/main" id="{76DB851C-3EB7-422A-8D3A-878544FE78E8}"/>
-              </a:ext>
-            </a:extLst>
-          </p:cNvPr>
-          <p:cNvSpPr txBox="1"/>
-          <p:nvPr/>
-        </p:nvSpPr>
-        <p:spPr>
-          <a:xfrm>
-            <a:off x="6071115" y="1729518"/>
-            <a:ext cx="2031325" cy="461665"/>
-          </a:xfrm>
-          <a:prstGeom prst="rect">
-            <a:avLst/>
-          </a:prstGeom>
-          <a:noFill/>
-        </p:spPr>
-        <p:txBody>
-          <a:bodyPr wrap="none" rtlCol="0">
-            <a:spAutoFit/>
-          </a:bodyPr>
-          <a:lstStyle/>
-          <a:p>
-            <a:pPr algn="ctr"/>
-            <a:r>
-              <a:rPr lang="ja-JP" altLang="en-US" sz="2400" dirty="0"/>
-              <a:t>角間　あざみ</a:t>
-            </a:r>
-            <a:endParaRPr lang="en-US" sz="2400" dirty="0"/>
-          </a:p>
-        </p:txBody>
-      </p:sp>
-      <p:sp>
-        <p:nvSpPr>
-          <p:cNvPr id="6" name="TextBox 5">
-            <a:extLst>
-              <a:ext uri="{FF2B5EF4-FFF2-40B4-BE49-F238E27FC236}">
-                <a16:creationId xmlns:a16="http://schemas.microsoft.com/office/drawing/2014/main" id="{E6F71F18-6E47-44FE-A8C1-DEE8CEFC6FF9}"/>
-              </a:ext>
-            </a:extLst>
-          </p:cNvPr>
-          <p:cNvSpPr txBox="1"/>
-          <p:nvPr/>
-        </p:nvSpPr>
-        <p:spPr>
-          <a:xfrm>
-            <a:off x="6014946" y="2102267"/>
-            <a:ext cx="2143664" cy="830997"/>
-          </a:xfrm>
-          <a:prstGeom prst="rect">
-            <a:avLst/>
-          </a:prstGeom>
-          <a:noFill/>
-        </p:spPr>
-        <p:txBody>
-          <a:bodyPr wrap="none" rtlCol="0">
-            <a:spAutoFit/>
-          </a:bodyPr>
-          <a:lstStyle/>
-          <a:p>
-            <a:pPr algn="ctr"/>
-            <a:r>
-              <a:rPr lang="en-US" sz="2400" dirty="0"/>
-              <a:t>KAKUMA </a:t>
-            </a:r>
-            <a:r>
-              <a:rPr lang="en-US" sz="2400" dirty="0" err="1"/>
-              <a:t>Azami</a:t>
-            </a:r>
-            <a:endParaRPr lang="en-US" sz="2400" dirty="0"/>
-          </a:p>
-          <a:p>
-            <a:pPr algn="ctr"/>
-            <a:r>
-              <a:rPr lang="en-US" sz="2400" dirty="0"/>
-              <a:t>195XXXXXXX</a:t>
-            </a:r>
-          </a:p>
-        </p:txBody>
-      </p:sp>
-      <p:sp>
-        <p:nvSpPr>
-          <p:cNvPr id="8" name="Arrow: Right 7">
-            <a:extLst>
-              <a:ext uri="{FF2B5EF4-FFF2-40B4-BE49-F238E27FC236}">
-                <a16:creationId xmlns:a16="http://schemas.microsoft.com/office/drawing/2014/main" id="{FCA04DA2-7F4F-4458-8DBD-99181B902F1B}"/>
-              </a:ext>
-            </a:extLst>
-          </p:cNvPr>
-          <p:cNvSpPr/>
-          <p:nvPr/>
-        </p:nvSpPr>
-        <p:spPr>
-          <a:xfrm>
-            <a:off x="4678274" y="2102267"/>
-            <a:ext cx="1218172" cy="632544"/>
-          </a:xfrm>
-          <a:prstGeom prst="rightArrow">
-            <a:avLst/>
-          </a:prstGeom>
-        </p:spPr>
-        <p:style>
-          <a:lnRef idx="2">
-            <a:schemeClr val="dk1">
-              <a:shade val="50000"/>
-            </a:schemeClr>
-          </a:lnRef>
-          <a:fillRef idx="1">
-            <a:schemeClr val="dk1"/>
-          </a:fillRef>
-          <a:effectRef idx="0">
-            <a:schemeClr val="dk1"/>
-          </a:effectRef>
-          <a:fontRef idx="minor">
-            <a:schemeClr val="lt1"/>
-          </a:fontRef>
-        </p:style>
-        <p:txBody>
-          <a:bodyPr rtlCol="0" anchor="ctr"/>
-          <a:lstStyle/>
-          <a:p>
-            <a:pPr algn="ctr"/>
-            <a:endParaRPr lang="en-US"/>
-          </a:p>
-        </p:txBody>
-      </p:sp>
-      <p:sp>
-        <p:nvSpPr>
-          <p:cNvPr id="9" name="TextBox 8">
-            <a:extLst>
-              <a:ext uri="{FF2B5EF4-FFF2-40B4-BE49-F238E27FC236}">
-                <a16:creationId xmlns:a16="http://schemas.microsoft.com/office/drawing/2014/main" id="{DEB22353-FBBF-4382-8F46-0E7A56577097}"/>
-              </a:ext>
-            </a:extLst>
-          </p:cNvPr>
-          <p:cNvSpPr txBox="1"/>
-          <p:nvPr/>
-        </p:nvSpPr>
-        <p:spPr>
-          <a:xfrm>
-            <a:off x="1308422" y="1690689"/>
-            <a:ext cx="3363985" cy="1415772"/>
-          </a:xfrm>
-          <a:prstGeom prst="rect">
-            <a:avLst/>
-          </a:prstGeom>
-        </p:spPr>
-        <p:style>
-          <a:lnRef idx="2">
-            <a:schemeClr val="dk1"/>
-          </a:lnRef>
-          <a:fillRef idx="1">
-            <a:schemeClr val="lt1"/>
-          </a:fillRef>
-          <a:effectRef idx="0">
-            <a:schemeClr val="dk1"/>
-          </a:effectRef>
-          <a:fontRef idx="minor">
-            <a:schemeClr val="dk1"/>
-          </a:fontRef>
-        </p:style>
-        <p:txBody>
-          <a:bodyPr wrap="square" rtlCol="0">
-            <a:spAutoFit/>
-          </a:bodyPr>
-          <a:lstStyle/>
-          <a:p>
-            <a:r>
-              <a:rPr lang="en-US" dirty="0"/>
-              <a:t>Write your name</a:t>
-            </a:r>
-            <a:br>
-              <a:rPr lang="en-US" dirty="0"/>
-            </a:br>
-            <a:r>
-              <a:rPr lang="en-US" dirty="0"/>
-              <a:t>* Kanji if you have one</a:t>
-            </a:r>
-            <a:br>
-              <a:rPr lang="en-US" dirty="0"/>
-            </a:br>
-            <a:r>
-              <a:rPr lang="en-US" dirty="0"/>
-              <a:t>* English </a:t>
-            </a:r>
-            <a:r>
-              <a:rPr lang="en-US" sz="1400" dirty="0"/>
-              <a:t>(first-last or last-first okay, but please write last name in CAPITALS)</a:t>
-            </a:r>
-          </a:p>
-          <a:p>
-            <a:r>
-              <a:rPr lang="en-US" dirty="0"/>
-              <a:t>* Full Student ID Number</a:t>
-            </a:r>
-            <a:endParaRPr lang="en-US" sz="2400" dirty="0"/>
-          </a:p>
-        </p:txBody>
-      </p:sp>
-      <p:sp>
-        <p:nvSpPr>
-          <p:cNvPr id="10" name="TextBox 9">
-            <a:extLst>
-              <a:ext uri="{FF2B5EF4-FFF2-40B4-BE49-F238E27FC236}">
-                <a16:creationId xmlns:a16="http://schemas.microsoft.com/office/drawing/2014/main" id="{2974C204-0F7F-428B-8F0F-A81CDFC6645E}"/>
-              </a:ext>
-            </a:extLst>
-          </p:cNvPr>
-          <p:cNvSpPr txBox="1"/>
-          <p:nvPr/>
-        </p:nvSpPr>
-        <p:spPr>
-          <a:xfrm>
-            <a:off x="956345" y="3238150"/>
-            <a:ext cx="7014116" cy="2308324"/>
-          </a:xfrm>
-          <a:prstGeom prst="rect">
-            <a:avLst/>
-          </a:prstGeom>
-          <a:noFill/>
-        </p:spPr>
-        <p:txBody>
-          <a:bodyPr wrap="square" rtlCol="0">
-            <a:spAutoFit/>
-          </a:bodyPr>
-          <a:lstStyle/>
-          <a:p>
-            <a:r>
-              <a:rPr lang="en-US" dirty="0"/>
-              <a:t>Write your answers in the paper.</a:t>
-            </a:r>
-          </a:p>
-          <a:p>
-            <a:r>
-              <a:rPr lang="ja-JP" altLang="en-US" dirty="0"/>
-              <a:t>紙に書いてください。</a:t>
-            </a:r>
-            <a:endParaRPr lang="en-US" dirty="0"/>
-          </a:p>
-          <a:p>
-            <a:r>
-              <a:rPr lang="en-US" dirty="0"/>
-              <a:t>Use pen only (do not use pencil), except diagrams and figures.</a:t>
-            </a:r>
-          </a:p>
-          <a:p>
-            <a:r>
-              <a:rPr lang="ja-JP" altLang="en-US" dirty="0"/>
-              <a:t>ペンのみ使ってください。図はえんぴつもＯＫです。</a:t>
-            </a:r>
-            <a:endParaRPr lang="en-US" dirty="0"/>
-          </a:p>
-          <a:p>
-            <a:r>
-              <a:rPr lang="en-US" dirty="0"/>
-              <a:t>SINCERELY attempt all questions, or your quiz will not be scored.</a:t>
-            </a:r>
-          </a:p>
-          <a:p>
-            <a:r>
-              <a:rPr lang="ja-JP" altLang="en-US" dirty="0"/>
-              <a:t>本気じゃないで答える場合は、クイズを採点しません。</a:t>
-            </a:r>
-            <a:endParaRPr lang="en-US" altLang="ja-JP" dirty="0"/>
-          </a:p>
-          <a:p>
-            <a:r>
-              <a:rPr lang="en-US" dirty="0"/>
-              <a:t>I may use your answer during class, but will not say whose answer it is.</a:t>
-            </a:r>
-          </a:p>
-          <a:p>
-            <a:r>
-              <a:rPr lang="ja-JP" altLang="en-US" dirty="0"/>
-              <a:t>あなたの答えを授業に使いますが、誰かのことは言えない。</a:t>
-            </a:r>
-            <a:endParaRPr lang="en-US" dirty="0"/>
-          </a:p>
-        </p:txBody>
-      </p:sp>
-      <p:sp>
-        <p:nvSpPr>
-          <p:cNvPr id="11" name="TextBox 10">
-            <a:extLst>
-              <a:ext uri="{FF2B5EF4-FFF2-40B4-BE49-F238E27FC236}">
-                <a16:creationId xmlns:a16="http://schemas.microsoft.com/office/drawing/2014/main" id="{68E1FBEE-3C4A-4C3A-9DEB-7AE94B6B6887}"/>
-              </a:ext>
-            </a:extLst>
-          </p:cNvPr>
-          <p:cNvSpPr txBox="1"/>
-          <p:nvPr/>
-        </p:nvSpPr>
-        <p:spPr>
-          <a:xfrm>
-            <a:off x="1259581" y="5609971"/>
-            <a:ext cx="6825651" cy="954107"/>
-          </a:xfrm>
-          <a:prstGeom prst="rect">
-            <a:avLst/>
-          </a:prstGeom>
-          <a:noFill/>
-        </p:spPr>
-        <p:txBody>
-          <a:bodyPr wrap="none" rtlCol="0">
-            <a:spAutoFit/>
-          </a:bodyPr>
-          <a:lstStyle/>
-          <a:p>
-            <a:pPr algn="ctr"/>
-            <a:r>
-              <a:rPr lang="en-US" sz="2800" dirty="0"/>
-              <a:t>TIME LIMIT: </a:t>
-            </a:r>
-            <a:r>
-              <a:rPr lang="en-US" sz="2800" dirty="0">
-                <a:solidFill>
-                  <a:srgbClr val="FF0000"/>
-                </a:solidFill>
-              </a:rPr>
-              <a:t>5 MINUTES AFTER CLASS STARTS</a:t>
-            </a:r>
-            <a:r>
-              <a:rPr lang="en-US" sz="2800" dirty="0"/>
-              <a:t>!</a:t>
-            </a:r>
-          </a:p>
-          <a:p>
-            <a:pPr algn="ctr"/>
-            <a:r>
-              <a:rPr lang="ja-JP" altLang="en-US" sz="2800" dirty="0"/>
-              <a:t>時間</a:t>
-            </a:r>
-            <a:r>
-              <a:rPr lang="en-US" altLang="ja-JP" sz="2800" dirty="0"/>
-              <a:t>:</a:t>
-            </a:r>
-            <a:r>
-              <a:rPr lang="ja-JP" altLang="en-US" sz="2800" dirty="0"/>
-              <a:t> 授業開始後</a:t>
-            </a:r>
-            <a:r>
-              <a:rPr lang="en-US" altLang="ja-JP" sz="2800" dirty="0"/>
-              <a:t>5</a:t>
-            </a:r>
-            <a:r>
-              <a:rPr lang="ja-JP" altLang="en-US" sz="2800" dirty="0"/>
-              <a:t>分まで！</a:t>
-            </a:r>
-            <a:endParaRPr lang="en-US" sz="2800" dirty="0"/>
-          </a:p>
-        </p:txBody>
-      </p:sp>
-      <p:sp>
-        <p:nvSpPr>
-          <p:cNvPr id="3" name="Slide Number Placeholder 2">
-            <a:extLst>
-              <a:ext uri="{FF2B5EF4-FFF2-40B4-BE49-F238E27FC236}">
-                <a16:creationId xmlns:a16="http://schemas.microsoft.com/office/drawing/2014/main" id="{6A767221-5713-4391-85B7-0BFB740BCD96}"/>
-              </a:ext>
-            </a:extLst>
-          </p:cNvPr>
-          <p:cNvSpPr>
-            <a:spLocks noGrp="1"/>
-          </p:cNvSpPr>
-          <p:nvPr>
-            <p:ph type="sldNum" sz="quarter" idx="12"/>
-          </p:nvPr>
-        </p:nvSpPr>
-        <p:spPr/>
-        <p:txBody>
-          <a:bodyPr/>
-          <a:lstStyle/>
-          <a:p>
-            <a:fld id="{0B02C7C3-1F9D-495C-A818-668CCDC0E8E2}" type="slidenum">
-              <a:rPr lang="en-US" smtClean="0"/>
-              <a:t>9</a:t>
-            </a:fld>
-            <a:endParaRPr lang="en-US"/>
-          </a:p>
-        </p:txBody>
-      </p:sp>
-    </p:spTree>
-    <p:extLst>
-      <p:ext uri="{BB962C8B-B14F-4D97-AF65-F5344CB8AC3E}">
-        <p14:creationId xmlns:p14="http://schemas.microsoft.com/office/powerpoint/2010/main" val="1635902425"/>
-      </p:ext>
-    </p:extLst>
-  </p:cSld>
-  <p:clrMapOvr>
-    <a:masterClrMapping/>
-  </p:clrMapOvr>
-</p:sld>
-</file>
-
 <file path=ppt/theme/theme1.xml><?xml version="1.0" encoding="utf-8"?>
 <a:theme xmlns:a="http://schemas.openxmlformats.org/drawingml/2006/main" name="Office Theme">
   <a:themeElements>

</xml_diff>